<commit_message>
Actualización Formulario para crear cliente
</commit_message>
<xml_diff>
--- a/modelo_relacional_BD.pptx
+++ b/modelo_relacional_BD.pptx
@@ -104,6 +104,11 @@
       </a:defRPr>
     </a:lvl9pPr>
   </p:defaultTextStyle>
+  <p:extLst>
+    <p:ext uri="{EFAFB233-063F-42B5-8137-9DF3F51BA10A}">
+      <p15:sldGuideLst xmlns:p15="http://schemas.microsoft.com/office/powerpoint/2012/main"/>
+    </p:ext>
+  </p:extLst>
 </p:presentation>
 </file>
 
@@ -238,7 +243,7 @@
           <a:p>
             <a:fld id="{9A5D7171-8884-4609-836F-E556DAC314CF}" type="datetimeFigureOut">
               <a:rPr lang="en-US" smtClean="0"/>
-              <a:t>8/4/2019</a:t>
+              <a:t>8/11/2019</a:t>
             </a:fld>
             <a:endParaRPr lang="en-US"/>
           </a:p>
@@ -408,7 +413,7 @@
           <a:p>
             <a:fld id="{9A5D7171-8884-4609-836F-E556DAC314CF}" type="datetimeFigureOut">
               <a:rPr lang="en-US" smtClean="0"/>
-              <a:t>8/4/2019</a:t>
+              <a:t>8/11/2019</a:t>
             </a:fld>
             <a:endParaRPr lang="en-US"/>
           </a:p>
@@ -588,7 +593,7 @@
           <a:p>
             <a:fld id="{9A5D7171-8884-4609-836F-E556DAC314CF}" type="datetimeFigureOut">
               <a:rPr lang="en-US" smtClean="0"/>
-              <a:t>8/4/2019</a:t>
+              <a:t>8/11/2019</a:t>
             </a:fld>
             <a:endParaRPr lang="en-US"/>
           </a:p>
@@ -758,7 +763,7 @@
           <a:p>
             <a:fld id="{9A5D7171-8884-4609-836F-E556DAC314CF}" type="datetimeFigureOut">
               <a:rPr lang="en-US" smtClean="0"/>
-              <a:t>8/4/2019</a:t>
+              <a:t>8/11/2019</a:t>
             </a:fld>
             <a:endParaRPr lang="en-US"/>
           </a:p>
@@ -1004,7 +1009,7 @@
           <a:p>
             <a:fld id="{9A5D7171-8884-4609-836F-E556DAC314CF}" type="datetimeFigureOut">
               <a:rPr lang="en-US" smtClean="0"/>
-              <a:t>8/4/2019</a:t>
+              <a:t>8/11/2019</a:t>
             </a:fld>
             <a:endParaRPr lang="en-US"/>
           </a:p>
@@ -1236,7 +1241,7 @@
           <a:p>
             <a:fld id="{9A5D7171-8884-4609-836F-E556DAC314CF}" type="datetimeFigureOut">
               <a:rPr lang="en-US" smtClean="0"/>
-              <a:t>8/4/2019</a:t>
+              <a:t>8/11/2019</a:t>
             </a:fld>
             <a:endParaRPr lang="en-US"/>
           </a:p>
@@ -1603,7 +1608,7 @@
           <a:p>
             <a:fld id="{9A5D7171-8884-4609-836F-E556DAC314CF}" type="datetimeFigureOut">
               <a:rPr lang="en-US" smtClean="0"/>
-              <a:t>8/4/2019</a:t>
+              <a:t>8/11/2019</a:t>
             </a:fld>
             <a:endParaRPr lang="en-US"/>
           </a:p>
@@ -1721,7 +1726,7 @@
           <a:p>
             <a:fld id="{9A5D7171-8884-4609-836F-E556DAC314CF}" type="datetimeFigureOut">
               <a:rPr lang="en-US" smtClean="0"/>
-              <a:t>8/4/2019</a:t>
+              <a:t>8/11/2019</a:t>
             </a:fld>
             <a:endParaRPr lang="en-US"/>
           </a:p>
@@ -1816,7 +1821,7 @@
           <a:p>
             <a:fld id="{9A5D7171-8884-4609-836F-E556DAC314CF}" type="datetimeFigureOut">
               <a:rPr lang="en-US" smtClean="0"/>
-              <a:t>8/4/2019</a:t>
+              <a:t>8/11/2019</a:t>
             </a:fld>
             <a:endParaRPr lang="en-US"/>
           </a:p>
@@ -2093,7 +2098,7 @@
           <a:p>
             <a:fld id="{9A5D7171-8884-4609-836F-E556DAC314CF}" type="datetimeFigureOut">
               <a:rPr lang="en-US" smtClean="0"/>
-              <a:t>8/4/2019</a:t>
+              <a:t>8/11/2019</a:t>
             </a:fld>
             <a:endParaRPr lang="en-US"/>
           </a:p>
@@ -2346,7 +2351,7 @@
           <a:p>
             <a:fld id="{9A5D7171-8884-4609-836F-E556DAC314CF}" type="datetimeFigureOut">
               <a:rPr lang="en-US" smtClean="0"/>
-              <a:t>8/4/2019</a:t>
+              <a:t>8/11/2019</a:t>
             </a:fld>
             <a:endParaRPr lang="en-US"/>
           </a:p>
@@ -2559,7 +2564,7 @@
           <a:p>
             <a:fld id="{9A5D7171-8884-4609-836F-E556DAC314CF}" type="datetimeFigureOut">
               <a:rPr lang="en-US" smtClean="0"/>
-              <a:t>8/4/2019</a:t>
+              <a:t>8/11/2019</a:t>
             </a:fld>
             <a:endParaRPr lang="en-US"/>
           </a:p>
@@ -2973,7 +2978,7 @@
         <p:spPr>
           <a:xfrm>
             <a:off x="1658983" y="809897"/>
-            <a:ext cx="2050868" cy="3139321"/>
+            <a:ext cx="2050868" cy="3693319"/>
           </a:xfrm>
           <a:prstGeom prst="rect">
             <a:avLst/>
@@ -3043,8 +3048,26 @@
           <a:p>
             <a:r>
               <a:rPr lang="es-CL" dirty="0" smtClean="0"/>
-              <a:t>_SCLIENAME</a:t>
-            </a:r>
+              <a:t>_</a:t>
+            </a:r>
+            <a:r>
+              <a:rPr lang="es-CL" dirty="0" smtClean="0"/>
+              <a:t>SCLIENAME</a:t>
+            </a:r>
+          </a:p>
+          <a:p>
+            <a:r>
+              <a:rPr lang="es-CL" dirty="0" smtClean="0"/>
+              <a:t>_SADDRESS</a:t>
+            </a:r>
+            <a:endParaRPr lang="es-CL" dirty="0" smtClean="0"/>
+          </a:p>
+          <a:p>
+            <a:r>
+              <a:rPr lang="es-CL" dirty="0" smtClean="0"/>
+              <a:t>_SEMAIL</a:t>
+            </a:r>
+            <a:endParaRPr lang="es-CL" dirty="0" smtClean="0"/>
           </a:p>
           <a:p>
             <a:r>
@@ -3129,11 +3152,7 @@
           <a:p>
             <a:r>
               <a:rPr lang="es-CL" dirty="0" smtClean="0"/>
-              <a:t>_</a:t>
-            </a:r>
-            <a:r>
-              <a:rPr lang="es-CL" dirty="0" smtClean="0"/>
-              <a:t>DCOMPDATE</a:t>
+              <a:t>_DCOMPDATE</a:t>
             </a:r>
           </a:p>
           <a:p>

</xml_diff>